<commit_message>
posodobljena predstavitev po klicu
</commit_message>
<xml_diff>
--- a/Predstavitev-v1.2.pptx
+++ b/Predstavitev-v1.2.pptx
@@ -5,7 +5,7 @@
     <p:sldMasterId id="2147483660" r:id="rId1"/>
   </p:sldMasterIdLst>
   <p:notesMasterIdLst>
-    <p:notesMasterId r:id="rId21"/>
+    <p:notesMasterId r:id="rId22"/>
   </p:notesMasterIdLst>
   <p:sldIdLst>
     <p:sldId id="275" r:id="rId2"/>
@@ -14,19 +14,20 @@
     <p:sldId id="257" r:id="rId5"/>
     <p:sldId id="274" r:id="rId6"/>
     <p:sldId id="258" r:id="rId7"/>
-    <p:sldId id="276" r:id="rId8"/>
-    <p:sldId id="277" r:id="rId9"/>
-    <p:sldId id="278" r:id="rId10"/>
-    <p:sldId id="280" r:id="rId11"/>
-    <p:sldId id="282" r:id="rId12"/>
-    <p:sldId id="285" r:id="rId13"/>
-    <p:sldId id="286" r:id="rId14"/>
-    <p:sldId id="284" r:id="rId15"/>
-    <p:sldId id="283" r:id="rId16"/>
-    <p:sldId id="269" r:id="rId17"/>
-    <p:sldId id="270" r:id="rId18"/>
-    <p:sldId id="287" r:id="rId19"/>
-    <p:sldId id="271" r:id="rId20"/>
+    <p:sldId id="288" r:id="rId8"/>
+    <p:sldId id="276" r:id="rId9"/>
+    <p:sldId id="277" r:id="rId10"/>
+    <p:sldId id="278" r:id="rId11"/>
+    <p:sldId id="280" r:id="rId12"/>
+    <p:sldId id="282" r:id="rId13"/>
+    <p:sldId id="285" r:id="rId14"/>
+    <p:sldId id="286" r:id="rId15"/>
+    <p:sldId id="284" r:id="rId16"/>
+    <p:sldId id="283" r:id="rId17"/>
+    <p:sldId id="269" r:id="rId18"/>
+    <p:sldId id="270" r:id="rId19"/>
+    <p:sldId id="287" r:id="rId20"/>
+    <p:sldId id="271" r:id="rId21"/>
   </p:sldIdLst>
   <p:sldSz cx="12192000" cy="6858000"/>
   <p:notesSz cx="6858000" cy="9144000"/>
@@ -131,6 +132,189 @@
     </p:ext>
   </p:extLst>
 </p:presentation>
+</file>
+
+<file path=ppt/revisionInfo.xml><?xml version="1.0" encoding="utf-8"?>
+<p1510:revInfo xmlns:a="http://schemas.openxmlformats.org/drawingml/2006/main" xmlns:r="http://schemas.openxmlformats.org/officeDocument/2006/relationships" xmlns:p1510="http://schemas.microsoft.com/office/powerpoint/2015/10/main">
+  <p1510:revLst>
+    <p1510:client id="{1168078A-82EC-4472-ADCA-E3200C86D7BD}" v="98" dt="2024-05-05T21:00:02.408"/>
+  </p1510:revLst>
+</p1510:revInfo>
+</file>
+
+<file path=ppt/changesInfos/changesInfo1.xml><?xml version="1.0" encoding="utf-8"?>
+<pc:chgInfo xmlns:a="http://schemas.openxmlformats.org/drawingml/2006/main" xmlns:r="http://schemas.openxmlformats.org/officeDocument/2006/relationships" xmlns:ac="http://schemas.microsoft.com/office/drawing/2013/main/command" xmlns:pc="http://schemas.microsoft.com/office/powerpoint/2013/main/command">
+  <pc:docChgLst>
+    <pc:chgData name="CIGLAR, LEON" userId="285fb6fd-28b6-4ef7-b00e-9fbdf251fdd4" providerId="ADAL" clId="{1168078A-82EC-4472-ADCA-E3200C86D7BD}"/>
+    <pc:docChg chg="undo custSel addSld delSld modSld">
+      <pc:chgData name="CIGLAR, LEON" userId="285fb6fd-28b6-4ef7-b00e-9fbdf251fdd4" providerId="ADAL" clId="{1168078A-82EC-4472-ADCA-E3200C86D7BD}" dt="2024-05-05T21:00:14.976" v="159" actId="1076"/>
+      <pc:docMkLst>
+        <pc:docMk/>
+      </pc:docMkLst>
+      <pc:sldChg chg="addSp delSp modSp mod modNotesTx">
+        <pc:chgData name="CIGLAR, LEON" userId="285fb6fd-28b6-4ef7-b00e-9fbdf251fdd4" providerId="ADAL" clId="{1168078A-82EC-4472-ADCA-E3200C86D7BD}" dt="2024-05-05T20:59:44.423" v="140"/>
+        <pc:sldMkLst>
+          <pc:docMk/>
+          <pc:sldMk cId="3697321481" sldId="258"/>
+        </pc:sldMkLst>
+        <pc:picChg chg="add mod">
+          <ac:chgData name="CIGLAR, LEON" userId="285fb6fd-28b6-4ef7-b00e-9fbdf251fdd4" providerId="ADAL" clId="{1168078A-82EC-4472-ADCA-E3200C86D7BD}" dt="2024-05-05T20:59:44.423" v="140"/>
+          <ac:picMkLst>
+            <pc:docMk/>
+            <pc:sldMk cId="3697321481" sldId="258"/>
+            <ac:picMk id="4" creationId="{6A089362-10BB-15D8-D836-2E97CE10A589}"/>
+          </ac:picMkLst>
+        </pc:picChg>
+        <pc:picChg chg="add del">
+          <ac:chgData name="CIGLAR, LEON" userId="285fb6fd-28b6-4ef7-b00e-9fbdf251fdd4" providerId="ADAL" clId="{1168078A-82EC-4472-ADCA-E3200C86D7BD}" dt="2024-05-05T20:59:41.733" v="137" actId="478"/>
+          <ac:picMkLst>
+            <pc:docMk/>
+            <pc:sldMk cId="3697321481" sldId="258"/>
+            <ac:picMk id="5" creationId="{DDA2A788-25A9-9CD7-2967-93C72B2C393A}"/>
+          </ac:picMkLst>
+        </pc:picChg>
+      </pc:sldChg>
+      <pc:sldChg chg="modSp mod modAnim">
+        <pc:chgData name="CIGLAR, LEON" userId="285fb6fd-28b6-4ef7-b00e-9fbdf251fdd4" providerId="ADAL" clId="{1168078A-82EC-4472-ADCA-E3200C86D7BD}" dt="2024-05-05T20:44:06.079" v="83"/>
+        <pc:sldMkLst>
+          <pc:docMk/>
+          <pc:sldMk cId="2563744363" sldId="269"/>
+        </pc:sldMkLst>
+        <pc:spChg chg="mod">
+          <ac:chgData name="CIGLAR, LEON" userId="285fb6fd-28b6-4ef7-b00e-9fbdf251fdd4" providerId="ADAL" clId="{1168078A-82EC-4472-ADCA-E3200C86D7BD}" dt="2024-05-05T20:32:37.953" v="13" actId="1076"/>
+          <ac:spMkLst>
+            <pc:docMk/>
+            <pc:sldMk cId="2563744363" sldId="269"/>
+            <ac:spMk id="2" creationId="{00000000-0000-0000-0000-000000000000}"/>
+          </ac:spMkLst>
+        </pc:spChg>
+        <pc:spChg chg="mod">
+          <ac:chgData name="CIGLAR, LEON" userId="285fb6fd-28b6-4ef7-b00e-9fbdf251fdd4" providerId="ADAL" clId="{1168078A-82EC-4472-ADCA-E3200C86D7BD}" dt="2024-05-05T20:32:58.660" v="29" actId="14100"/>
+          <ac:spMkLst>
+            <pc:docMk/>
+            <pc:sldMk cId="2563744363" sldId="269"/>
+            <ac:spMk id="4" creationId="{00000000-0000-0000-0000-000000000000}"/>
+          </ac:spMkLst>
+        </pc:spChg>
+        <pc:picChg chg="mod">
+          <ac:chgData name="CIGLAR, LEON" userId="285fb6fd-28b6-4ef7-b00e-9fbdf251fdd4" providerId="ADAL" clId="{1168078A-82EC-4472-ADCA-E3200C86D7BD}" dt="2024-05-05T20:32:40.844" v="15" actId="1076"/>
+          <ac:picMkLst>
+            <pc:docMk/>
+            <pc:sldMk cId="2563744363" sldId="269"/>
+            <ac:picMk id="6" creationId="{09BA168E-493D-E3CA-0E7E-FEBDC18966E9}"/>
+          </ac:picMkLst>
+        </pc:picChg>
+      </pc:sldChg>
+      <pc:sldChg chg="addSp delSp modSp mod">
+        <pc:chgData name="CIGLAR, LEON" userId="285fb6fd-28b6-4ef7-b00e-9fbdf251fdd4" providerId="ADAL" clId="{1168078A-82EC-4472-ADCA-E3200C86D7BD}" dt="2024-05-05T20:59:55.047" v="143" actId="1076"/>
+        <pc:sldMkLst>
+          <pc:docMk/>
+          <pc:sldMk cId="3118722564" sldId="282"/>
+        </pc:sldMkLst>
+        <pc:picChg chg="add mod">
+          <ac:chgData name="CIGLAR, LEON" userId="285fb6fd-28b6-4ef7-b00e-9fbdf251fdd4" providerId="ADAL" clId="{1168078A-82EC-4472-ADCA-E3200C86D7BD}" dt="2024-05-05T20:59:55.047" v="143" actId="1076"/>
+          <ac:picMkLst>
+            <pc:docMk/>
+            <pc:sldMk cId="3118722564" sldId="282"/>
+            <ac:picMk id="4" creationId="{2D696555-03C6-E2B9-6F5E-0151CAFF61C9}"/>
+          </ac:picMkLst>
+        </pc:picChg>
+        <pc:picChg chg="del">
+          <ac:chgData name="CIGLAR, LEON" userId="285fb6fd-28b6-4ef7-b00e-9fbdf251fdd4" providerId="ADAL" clId="{1168078A-82EC-4472-ADCA-E3200C86D7BD}" dt="2024-05-05T20:53:24.524" v="112" actId="478"/>
+          <ac:picMkLst>
+            <pc:docMk/>
+            <pc:sldMk cId="3118722564" sldId="282"/>
+            <ac:picMk id="6" creationId="{AF0DD07F-9292-B047-5B49-9EC23A51BCA3}"/>
+          </ac:picMkLst>
+        </pc:picChg>
+      </pc:sldChg>
+      <pc:sldChg chg="modSp mod modAnim">
+        <pc:chgData name="CIGLAR, LEON" userId="285fb6fd-28b6-4ef7-b00e-9fbdf251fdd4" providerId="ADAL" clId="{1168078A-82EC-4472-ADCA-E3200C86D7BD}" dt="2024-05-05T20:51:59.051" v="109" actId="20577"/>
+        <pc:sldMkLst>
+          <pc:docMk/>
+          <pc:sldMk cId="2309041543" sldId="283"/>
+        </pc:sldMkLst>
+        <pc:spChg chg="mod">
+          <ac:chgData name="CIGLAR, LEON" userId="285fb6fd-28b6-4ef7-b00e-9fbdf251fdd4" providerId="ADAL" clId="{1168078A-82EC-4472-ADCA-E3200C86D7BD}" dt="2024-05-05T20:51:59.051" v="109" actId="20577"/>
+          <ac:spMkLst>
+            <pc:docMk/>
+            <pc:sldMk cId="2309041543" sldId="283"/>
+            <ac:spMk id="5" creationId="{019D1206-CF02-903C-3F0A-85F777FD8A28}"/>
+          </ac:spMkLst>
+        </pc:spChg>
+      </pc:sldChg>
+      <pc:sldChg chg="addSp delSp modSp new del mod">
+        <pc:chgData name="CIGLAR, LEON" userId="285fb6fd-28b6-4ef7-b00e-9fbdf251fdd4" providerId="ADAL" clId="{1168078A-82EC-4472-ADCA-E3200C86D7BD}" dt="2024-05-05T20:59:40.088" v="135" actId="680"/>
+        <pc:sldMkLst>
+          <pc:docMk/>
+          <pc:sldMk cId="170283071" sldId="288"/>
+        </pc:sldMkLst>
+        <pc:spChg chg="add del">
+          <ac:chgData name="CIGLAR, LEON" userId="285fb6fd-28b6-4ef7-b00e-9fbdf251fdd4" providerId="ADAL" clId="{1168078A-82EC-4472-ADCA-E3200C86D7BD}" dt="2024-05-05T20:59:37.654" v="131"/>
+          <ac:spMkLst>
+            <pc:docMk/>
+            <pc:sldMk cId="170283071" sldId="288"/>
+            <ac:spMk id="3" creationId="{6C6F3699-72AF-E404-28B4-667344C60FC7}"/>
+          </ac:spMkLst>
+        </pc:spChg>
+        <pc:picChg chg="add mod">
+          <ac:chgData name="CIGLAR, LEON" userId="285fb6fd-28b6-4ef7-b00e-9fbdf251fdd4" providerId="ADAL" clId="{1168078A-82EC-4472-ADCA-E3200C86D7BD}" dt="2024-05-05T20:59:37.654" v="131"/>
+          <ac:picMkLst>
+            <pc:docMk/>
+            <pc:sldMk cId="170283071" sldId="288"/>
+            <ac:picMk id="5" creationId="{2C42F71E-F22E-3E0B-A9B4-1EFFA6150777}"/>
+          </ac:picMkLst>
+        </pc:picChg>
+        <pc:picChg chg="add del mod">
+          <ac:chgData name="CIGLAR, LEON" userId="285fb6fd-28b6-4ef7-b00e-9fbdf251fdd4" providerId="ADAL" clId="{1168078A-82EC-4472-ADCA-E3200C86D7BD}" dt="2024-05-05T20:59:39.021" v="134" actId="1076"/>
+          <ac:picMkLst>
+            <pc:docMk/>
+            <pc:sldMk cId="170283071" sldId="288"/>
+            <ac:picMk id="1026" creationId="{DC98B675-7DB8-8014-FE66-1409BF2535A6}"/>
+          </ac:picMkLst>
+        </pc:picChg>
+      </pc:sldChg>
+      <pc:sldChg chg="addSp delSp modSp new mod">
+        <pc:chgData name="CIGLAR, LEON" userId="285fb6fd-28b6-4ef7-b00e-9fbdf251fdd4" providerId="ADAL" clId="{1168078A-82EC-4472-ADCA-E3200C86D7BD}" dt="2024-05-05T21:00:14.976" v="159" actId="1076"/>
+        <pc:sldMkLst>
+          <pc:docMk/>
+          <pc:sldMk cId="383258308" sldId="288"/>
+        </pc:sldMkLst>
+        <pc:spChg chg="mod">
+          <ac:chgData name="CIGLAR, LEON" userId="285fb6fd-28b6-4ef7-b00e-9fbdf251fdd4" providerId="ADAL" clId="{1168078A-82EC-4472-ADCA-E3200C86D7BD}" dt="2024-05-05T21:00:09.199" v="157" actId="20577"/>
+          <ac:spMkLst>
+            <pc:docMk/>
+            <pc:sldMk cId="383258308" sldId="288"/>
+            <ac:spMk id="2" creationId="{EFC70A13-7791-DF9A-4D22-73FC0CE9037A}"/>
+          </ac:spMkLst>
+        </pc:spChg>
+        <pc:spChg chg="del">
+          <ac:chgData name="CIGLAR, LEON" userId="285fb6fd-28b6-4ef7-b00e-9fbdf251fdd4" providerId="ADAL" clId="{1168078A-82EC-4472-ADCA-E3200C86D7BD}" dt="2024-05-05T21:00:02.408" v="145"/>
+          <ac:spMkLst>
+            <pc:docMk/>
+            <pc:sldMk cId="383258308" sldId="288"/>
+            <ac:spMk id="3" creationId="{C13349BB-3557-4766-EDCF-FBCBEDB59D81}"/>
+          </ac:spMkLst>
+        </pc:spChg>
+        <pc:picChg chg="add mod">
+          <ac:chgData name="CIGLAR, LEON" userId="285fb6fd-28b6-4ef7-b00e-9fbdf251fdd4" providerId="ADAL" clId="{1168078A-82EC-4472-ADCA-E3200C86D7BD}" dt="2024-05-05T21:00:14.976" v="159" actId="1076"/>
+          <ac:picMkLst>
+            <pc:docMk/>
+            <pc:sldMk cId="383258308" sldId="288"/>
+            <ac:picMk id="5" creationId="{EC351DB2-C7C6-764F-241E-760460A3E26C}"/>
+          </ac:picMkLst>
+        </pc:picChg>
+      </pc:sldChg>
+      <pc:sldChg chg="new del">
+        <pc:chgData name="CIGLAR, LEON" userId="285fb6fd-28b6-4ef7-b00e-9fbdf251fdd4" providerId="ADAL" clId="{1168078A-82EC-4472-ADCA-E3200C86D7BD}" dt="2024-05-05T20:59:49.322" v="142" actId="680"/>
+        <pc:sldMkLst>
+          <pc:docMk/>
+          <pc:sldMk cId="4052281255" sldId="288"/>
+        </pc:sldMkLst>
+      </pc:sldChg>
+    </pc:docChg>
+  </pc:docChgLst>
+</pc:chgInfo>
 </file>
 
 <file path=ppt/notesMasters/notesMaster1.xml><?xml version="1.0" encoding="utf-8"?>
@@ -695,7 +879,7 @@
       </p:grpSpPr>
       <p:sp>
         <p:nvSpPr>
-          <p:cNvPr id="2" name="Slide Image Placeholder 1"/>
+          <p:cNvPr id="2" name="Označba mesta stranske slike 1"/>
           <p:cNvSpPr>
             <a:spLocks noGrp="1" noRot="1" noChangeAspect="1"/>
           </p:cNvSpPr>
@@ -707,7 +891,7 @@
       </p:sp>
       <p:sp>
         <p:nvSpPr>
-          <p:cNvPr id="3" name="Notes Placeholder 2"/>
+          <p:cNvPr id="3" name="Označba mesta opomb 2"/>
           <p:cNvSpPr>
             <a:spLocks noGrp="1"/>
           </p:cNvSpPr>
@@ -720,13 +904,21 @@
           <a:bodyPr/>
           <a:lstStyle/>
           <a:p>
+            <a:r>
+              <a:rPr lang="sl-SI" dirty="0"/>
+              <a:t>Hierarhična analiza </a:t>
+            </a:r>
+            <a:r>
+              <a:rPr lang="sl-SI" dirty="0" err="1"/>
+              <a:t>taskov</a:t>
+            </a:r>
             <a:endParaRPr lang="sl-SI" dirty="0"/>
           </a:p>
         </p:txBody>
       </p:sp>
       <p:sp>
         <p:nvSpPr>
-          <p:cNvPr id="4" name="Slide Number Placeholder 3"/>
+          <p:cNvPr id="4" name="Označba mesta številke diapozitiva 3"/>
           <p:cNvSpPr>
             <a:spLocks noGrp="1"/>
           </p:cNvSpPr>
@@ -741,7 +933,7 @@
           <a:p>
             <a:fld id="{DA052704-8F55-4125-A8EF-0CE5FC0A1879}" type="slidenum">
               <a:rPr lang="sl-SI" smtClean="0"/>
-              <a:t>15</a:t>
+              <a:t>6</a:t>
             </a:fld>
             <a:endParaRPr lang="sl-SI"/>
           </a:p>
@@ -750,7 +942,7 @@
     </p:spTree>
     <p:extLst>
       <p:ext uri="{BB962C8B-B14F-4D97-AF65-F5344CB8AC3E}">
-        <p14:creationId xmlns:p14="http://schemas.microsoft.com/office/powerpoint/2010/main" val="4198874806"/>
+        <p14:creationId xmlns:p14="http://schemas.microsoft.com/office/powerpoint/2010/main" val="808752360"/>
       </p:ext>
     </p:extLst>
   </p:cSld>
@@ -779,7 +971,7 @@
       </p:grpSpPr>
       <p:sp>
         <p:nvSpPr>
-          <p:cNvPr id="2" name="Označba mesta stranske slike 1"/>
+          <p:cNvPr id="2" name="Slide Image Placeholder 1"/>
           <p:cNvSpPr>
             <a:spLocks noGrp="1" noRot="1" noChangeAspect="1"/>
           </p:cNvSpPr>
@@ -791,7 +983,7 @@
       </p:sp>
       <p:sp>
         <p:nvSpPr>
-          <p:cNvPr id="3" name="Označba mesta opomb 2"/>
+          <p:cNvPr id="3" name="Notes Placeholder 2"/>
           <p:cNvSpPr>
             <a:spLocks noGrp="1"/>
           </p:cNvSpPr>
@@ -810,12 +1002,12 @@
       </p:sp>
       <p:sp>
         <p:nvSpPr>
-          <p:cNvPr id="4" name="Označba mesta številke diapozitiva 3"/>
-          <p:cNvSpPr>
-            <a:spLocks noGrp="1"/>
-          </p:cNvSpPr>
-          <p:nvPr>
-            <p:ph type="sldNum" sz="quarter" idx="10"/>
+          <p:cNvPr id="4" name="Slide Number Placeholder 3"/>
+          <p:cNvSpPr>
+            <a:spLocks noGrp="1"/>
+          </p:cNvSpPr>
+          <p:nvPr>
+            <p:ph type="sldNum" sz="quarter" idx="5"/>
           </p:nvPr>
         </p:nvSpPr>
         <p:spPr/>
@@ -834,7 +1026,7 @@
     </p:spTree>
     <p:extLst>
       <p:ext uri="{BB962C8B-B14F-4D97-AF65-F5344CB8AC3E}">
-        <p14:creationId xmlns:p14="http://schemas.microsoft.com/office/powerpoint/2010/main" val="1975465035"/>
+        <p14:creationId xmlns:p14="http://schemas.microsoft.com/office/powerpoint/2010/main" val="4198874806"/>
       </p:ext>
     </p:extLst>
   </p:cSld>
@@ -918,7 +1110,7 @@
     </p:spTree>
     <p:extLst>
       <p:ext uri="{BB962C8B-B14F-4D97-AF65-F5344CB8AC3E}">
-        <p14:creationId xmlns:p14="http://schemas.microsoft.com/office/powerpoint/2010/main" val="2834696009"/>
+        <p14:creationId xmlns:p14="http://schemas.microsoft.com/office/powerpoint/2010/main" val="1975465035"/>
       </p:ext>
     </p:extLst>
   </p:cSld>
@@ -993,7 +1185,91 @@
           <a:p>
             <a:fld id="{DA052704-8F55-4125-A8EF-0CE5FC0A1879}" type="slidenum">
               <a:rPr lang="sl-SI" smtClean="0"/>
-              <a:t>19</a:t>
+              <a:t>18</a:t>
+            </a:fld>
+            <a:endParaRPr lang="sl-SI"/>
+          </a:p>
+        </p:txBody>
+      </p:sp>
+    </p:spTree>
+    <p:extLst>
+      <p:ext uri="{BB962C8B-B14F-4D97-AF65-F5344CB8AC3E}">
+        <p14:creationId xmlns:p14="http://schemas.microsoft.com/office/powerpoint/2010/main" val="2834696009"/>
+      </p:ext>
+    </p:extLst>
+  </p:cSld>
+  <p:clrMapOvr>
+    <a:masterClrMapping/>
+  </p:clrMapOvr>
+</p:notes>
+</file>
+
+<file path=ppt/notesSlides/notesSlide7.xml><?xml version="1.0" encoding="utf-8"?>
+<p:notes xmlns:a="http://schemas.openxmlformats.org/drawingml/2006/main" xmlns:r="http://schemas.openxmlformats.org/officeDocument/2006/relationships" xmlns:p="http://schemas.openxmlformats.org/presentationml/2006/main">
+  <p:cSld>
+    <p:spTree>
+      <p:nvGrpSpPr>
+        <p:cNvPr id="1" name=""/>
+        <p:cNvGrpSpPr/>
+        <p:nvPr/>
+      </p:nvGrpSpPr>
+      <p:grpSpPr>
+        <a:xfrm>
+          <a:off x="0" y="0"/>
+          <a:ext cx="0" cy="0"/>
+          <a:chOff x="0" y="0"/>
+          <a:chExt cx="0" cy="0"/>
+        </a:xfrm>
+      </p:grpSpPr>
+      <p:sp>
+        <p:nvSpPr>
+          <p:cNvPr id="2" name="Označba mesta stranske slike 1"/>
+          <p:cNvSpPr>
+            <a:spLocks noGrp="1" noRot="1" noChangeAspect="1"/>
+          </p:cNvSpPr>
+          <p:nvPr>
+            <p:ph type="sldImg"/>
+          </p:nvPr>
+        </p:nvSpPr>
+        <p:spPr/>
+      </p:sp>
+      <p:sp>
+        <p:nvSpPr>
+          <p:cNvPr id="3" name="Označba mesta opomb 2"/>
+          <p:cNvSpPr>
+            <a:spLocks noGrp="1"/>
+          </p:cNvSpPr>
+          <p:nvPr>
+            <p:ph type="body" idx="1"/>
+          </p:nvPr>
+        </p:nvSpPr>
+        <p:spPr/>
+        <p:txBody>
+          <a:bodyPr/>
+          <a:lstStyle/>
+          <a:p>
+            <a:endParaRPr lang="sl-SI" dirty="0"/>
+          </a:p>
+        </p:txBody>
+      </p:sp>
+      <p:sp>
+        <p:nvSpPr>
+          <p:cNvPr id="4" name="Označba mesta številke diapozitiva 3"/>
+          <p:cNvSpPr>
+            <a:spLocks noGrp="1"/>
+          </p:cNvSpPr>
+          <p:nvPr>
+            <p:ph type="sldNum" sz="quarter" idx="10"/>
+          </p:nvPr>
+        </p:nvSpPr>
+        <p:spPr/>
+        <p:txBody>
+          <a:bodyPr/>
+          <a:lstStyle/>
+          <a:p>
+            <a:fld id="{DA052704-8F55-4125-A8EF-0CE5FC0A1879}" type="slidenum">
+              <a:rPr lang="sl-SI" smtClean="0"/>
+              <a:t>20</a:t>
             </a:fld>
             <a:endParaRPr lang="sl-SI"/>
           </a:p>
@@ -4001,6 +4277,112 @@
       </p:sp>
       <p:pic>
         <p:nvPicPr>
+          <p:cNvPr id="6" name="Slika 5">
+            <a:extLst>
+              <a:ext uri="{FF2B5EF4-FFF2-40B4-BE49-F238E27FC236}">
+                <a16:creationId xmlns:a16="http://schemas.microsoft.com/office/drawing/2014/main" id="{B861D025-6ED4-30C8-C742-51A4B16184EC}"/>
+              </a:ext>
+            </a:extLst>
+          </p:cNvPr>
+          <p:cNvPicPr>
+            <a:picLocks noChangeAspect="1"/>
+          </p:cNvPicPr>
+          <p:nvPr/>
+        </p:nvPicPr>
+        <p:blipFill>
+          <a:blip r:embed="rId2"/>
+          <a:stretch>
+            <a:fillRect/>
+          </a:stretch>
+        </p:blipFill>
+        <p:spPr>
+          <a:xfrm>
+            <a:off x="4237932" y="0"/>
+            <a:ext cx="3716136" cy="7966785"/>
+          </a:xfrm>
+          <a:prstGeom prst="rect">
+            <a:avLst/>
+          </a:prstGeom>
+        </p:spPr>
+      </p:pic>
+    </p:spTree>
+    <p:extLst>
+      <p:ext uri="{BB962C8B-B14F-4D97-AF65-F5344CB8AC3E}">
+        <p14:creationId xmlns:p14="http://schemas.microsoft.com/office/powerpoint/2010/main" val="140690240"/>
+      </p:ext>
+    </p:extLst>
+  </p:cSld>
+  <p:clrMapOvr>
+    <a:masterClrMapping/>
+  </p:clrMapOvr>
+</p:sld>
+</file>
+
+<file path=ppt/slides/slide11.xml><?xml version="1.0" encoding="utf-8"?>
+<p:sld xmlns:a="http://schemas.openxmlformats.org/drawingml/2006/main" xmlns:r="http://schemas.openxmlformats.org/officeDocument/2006/relationships" xmlns:p="http://schemas.openxmlformats.org/presentationml/2006/main">
+  <p:cSld>
+    <p:spTree>
+      <p:nvGrpSpPr>
+        <p:cNvPr id="1" name=""/>
+        <p:cNvGrpSpPr/>
+        <p:nvPr/>
+      </p:nvGrpSpPr>
+      <p:grpSpPr>
+        <a:xfrm>
+          <a:off x="0" y="0"/>
+          <a:ext cx="0" cy="0"/>
+          <a:chOff x="0" y="0"/>
+          <a:chExt cx="0" cy="0"/>
+        </a:xfrm>
+      </p:grpSpPr>
+      <p:sp>
+        <p:nvSpPr>
+          <p:cNvPr id="2" name="Naslov 1"/>
+          <p:cNvSpPr>
+            <a:spLocks noGrp="1"/>
+          </p:cNvSpPr>
+          <p:nvPr>
+            <p:ph type="title"/>
+          </p:nvPr>
+        </p:nvSpPr>
+        <p:spPr/>
+        <p:txBody>
+          <a:bodyPr>
+            <a:normAutofit/>
+          </a:bodyPr>
+          <a:lstStyle/>
+          <a:p>
+            <a:endParaRPr lang="sl-SI" sz="4000" dirty="0"/>
+          </a:p>
+        </p:txBody>
+      </p:sp>
+      <p:sp>
+        <p:nvSpPr>
+          <p:cNvPr id="5" name="Označba mesta vsebine 4">
+            <a:extLst>
+              <a:ext uri="{FF2B5EF4-FFF2-40B4-BE49-F238E27FC236}">
+                <a16:creationId xmlns:a16="http://schemas.microsoft.com/office/drawing/2014/main" id="{019D1206-CF02-903C-3F0A-85F777FD8A28}"/>
+              </a:ext>
+            </a:extLst>
+          </p:cNvPr>
+          <p:cNvSpPr>
+            <a:spLocks noGrp="1"/>
+          </p:cNvSpPr>
+          <p:nvPr>
+            <p:ph idx="1"/>
+          </p:nvPr>
+        </p:nvSpPr>
+        <p:spPr/>
+        <p:txBody>
+          <a:bodyPr/>
+          <a:lstStyle/>
+          <a:p>
+            <a:endParaRPr lang="sl-SI" dirty="0"/>
+          </a:p>
+        </p:txBody>
+      </p:sp>
+      <p:pic>
+        <p:nvPicPr>
           <p:cNvPr id="4" name="Slika 3">
             <a:extLst>
               <a:ext uri="{FF2B5EF4-FFF2-40B4-BE49-F238E27FC236}">
@@ -4042,7 +4424,7 @@
 </p:sld>
 </file>
 
-<file path=ppt/slides/slide11.xml><?xml version="1.0" encoding="utf-8"?>
+<file path=ppt/slides/slide12.xml><?xml version="1.0" encoding="utf-8"?>
 <p:sld xmlns:a="http://schemas.openxmlformats.org/drawingml/2006/main" xmlns:r="http://schemas.openxmlformats.org/officeDocument/2006/relationships" xmlns:p="http://schemas.openxmlformats.org/presentationml/2006/main">
   <p:cSld>
     <p:spTree>
@@ -4107,10 +4489,10 @@
       </p:sp>
       <p:pic>
         <p:nvPicPr>
-          <p:cNvPr id="6" name="Slika 5">
+          <p:cNvPr id="4" name="Slika 3">
             <a:extLst>
               <a:ext uri="{FF2B5EF4-FFF2-40B4-BE49-F238E27FC236}">
-                <a16:creationId xmlns:a16="http://schemas.microsoft.com/office/drawing/2014/main" id="{AF0DD07F-9292-B047-5B49-9EC23A51BCA3}"/>
+                <a16:creationId xmlns:a16="http://schemas.microsoft.com/office/drawing/2014/main" id="{2D696555-03C6-E2B9-6F5E-0151CAFF61C9}"/>
               </a:ext>
             </a:extLst>
           </p:cNvPr>
@@ -4127,8 +4509,8 @@
         </p:blipFill>
         <p:spPr>
           <a:xfrm>
-            <a:off x="4006527" y="0"/>
-            <a:ext cx="4178946" cy="6858000"/>
+            <a:off x="3955783" y="643263"/>
+            <a:ext cx="4229690" cy="6716062"/>
           </a:xfrm>
           <a:prstGeom prst="rect">
             <a:avLst/>
@@ -4148,7 +4530,7 @@
 </p:sld>
 </file>
 
-<file path=ppt/slides/slide12.xml><?xml version="1.0" encoding="utf-8"?>
+<file path=ppt/slides/slide13.xml><?xml version="1.0" encoding="utf-8"?>
 <p:sld xmlns:a="http://schemas.openxmlformats.org/drawingml/2006/main" xmlns:r="http://schemas.openxmlformats.org/officeDocument/2006/relationships" xmlns:p="http://schemas.openxmlformats.org/presentationml/2006/main">
   <p:cSld>
     <p:spTree>
@@ -4254,7 +4636,7 @@
 </p:sld>
 </file>
 
-<file path=ppt/slides/slide13.xml><?xml version="1.0" encoding="utf-8"?>
+<file path=ppt/slides/slide14.xml><?xml version="1.0" encoding="utf-8"?>
 <p:sld xmlns:a="http://schemas.openxmlformats.org/drawingml/2006/main" xmlns:r="http://schemas.openxmlformats.org/officeDocument/2006/relationships" xmlns:p="http://schemas.openxmlformats.org/presentationml/2006/main">
   <p:cSld>
     <p:spTree>
@@ -4360,7 +4742,7 @@
 </p:sld>
 </file>
 
-<file path=ppt/slides/slide14.xml><?xml version="1.0" encoding="utf-8"?>
+<file path=ppt/slides/slide15.xml><?xml version="1.0" encoding="utf-8"?>
 <p:sld xmlns:a="http://schemas.openxmlformats.org/drawingml/2006/main" xmlns:r="http://schemas.openxmlformats.org/officeDocument/2006/relationships" xmlns:p="http://schemas.openxmlformats.org/presentationml/2006/main">
   <p:cSld>
     <p:spTree>
@@ -4466,7 +4848,7 @@
 </p:sld>
 </file>
 
-<file path=ppt/slides/slide15.xml><?xml version="1.0" encoding="utf-8"?>
+<file path=ppt/slides/slide16.xml><?xml version="1.0" encoding="utf-8"?>
 <p:sld xmlns:a="http://schemas.openxmlformats.org/drawingml/2006/main" xmlns:r="http://schemas.openxmlformats.org/officeDocument/2006/relationships" xmlns:p="http://schemas.openxmlformats.org/presentationml/2006/main">
   <p:cSld>
     <p:spTree>
@@ -4546,38 +4928,21 @@
             <a:pPr lvl="1"/>
             <a:r>
               <a:rPr lang="sl-SI" dirty="0"/>
-              <a:t>L</a:t>
-            </a:r>
-            <a:r>
-              <a:rPr lang="en-SI" dirty="0" err="1"/>
-              <a:t>ogin</a:t>
-            </a:r>
+              <a:t>Prva stran</a:t>
+            </a:r>
+          </a:p>
+          <a:p>
+            <a:pPr lvl="1"/>
             <a:r>
               <a:rPr lang="en-SI" dirty="0"/>
-              <a:t> page</a:t>
+              <a:t>Vprašalnik</a:t>
             </a:r>
           </a:p>
           <a:p>
             <a:pPr lvl="1"/>
             <a:r>
-              <a:rPr lang="en-SI" dirty="0" err="1"/>
-              <a:t>Vprašalnik</a:t>
-            </a:r>
-            <a:endParaRPr lang="en-SI" dirty="0"/>
-          </a:p>
-          <a:p>
-            <a:pPr lvl="1"/>
-            <a:r>
-              <a:rPr lang="en-SI" dirty="0" err="1"/>
-              <a:t>Postavitev</a:t>
-            </a:r>
-            <a:r>
-              <a:rPr lang="en-SI" dirty="0"/>
-              <a:t> </a:t>
-            </a:r>
-            <a:r>
-              <a:rPr lang="en-SI" dirty="0" err="1"/>
-              <a:t>baze</a:t>
+              <a:rPr lang="sl-SI" dirty="0"/>
+              <a:t>Stranski meni</a:t>
             </a:r>
             <a:endParaRPr lang="en-SI" dirty="0"/>
           </a:p>
@@ -4596,40 +4961,32 @@
             <a:pPr lvl="1"/>
             <a:r>
               <a:rPr lang="en-SI" dirty="0"/>
-              <a:t>Portfolio pages</a:t>
-            </a:r>
+              <a:t>Portfolio page</a:t>
+            </a:r>
+            <a:endParaRPr lang="sl-SI" dirty="0"/>
           </a:p>
           <a:p>
             <a:pPr lvl="1"/>
             <a:r>
-              <a:rPr lang="en-SI" dirty="0" err="1"/>
-              <a:t>Dinamično</a:t>
-            </a:r>
+              <a:rPr lang="sl-SI" dirty="0"/>
+              <a:t>Spustni meni</a:t>
+            </a:r>
+            <a:endParaRPr lang="en-SI" dirty="0"/>
+          </a:p>
+          <a:p>
+            <a:pPr lvl="1"/>
             <a:r>
               <a:rPr lang="en-SI" dirty="0"/>
-              <a:t> </a:t>
-            </a:r>
-            <a:r>
-              <a:rPr lang="en-SI" dirty="0" err="1"/>
-              <a:t>prilagajanje</a:t>
+              <a:t>Dinamično prilagajanje</a:t>
+            </a:r>
+            <a:r>
+              <a:rPr lang="sl-SI" dirty="0"/>
+              <a:t> portfelj</a:t>
             </a:r>
             <a:r>
               <a:rPr lang="en-SI" dirty="0"/>
-              <a:t> glede </a:t>
-            </a:r>
-            <a:r>
-              <a:rPr lang="en-SI" dirty="0" err="1"/>
-              <a:t>na</a:t>
-            </a:r>
-            <a:r>
-              <a:rPr lang="en-SI" dirty="0"/>
-              <a:t> </a:t>
-            </a:r>
-            <a:r>
-              <a:rPr lang="en-SI" dirty="0" err="1"/>
-              <a:t>vprašalnik</a:t>
-            </a:r>
-            <a:endParaRPr lang="en-SI" dirty="0"/>
+              <a:t> glede na vprašalnik</a:t>
+            </a:r>
           </a:p>
           <a:p>
             <a:pPr lvl="1"/>
@@ -5002,6 +5359,55 @@
                       </p:childTnLst>
                     </p:cTn>
                   </p:par>
+                  <p:par>
+                    <p:cTn id="31" fill="hold">
+                      <p:stCondLst>
+                        <p:cond delay="indefinite"/>
+                      </p:stCondLst>
+                      <p:childTnLst>
+                        <p:par>
+                          <p:cTn id="32" fill="hold">
+                            <p:stCondLst>
+                              <p:cond delay="0"/>
+                            </p:stCondLst>
+                            <p:childTnLst>
+                              <p:par>
+                                <p:cTn id="33" presetID="1" presetClass="entr" presetSubtype="0" fill="hold" nodeType="clickEffect">
+                                  <p:stCondLst>
+                                    <p:cond delay="0"/>
+                                  </p:stCondLst>
+                                  <p:childTnLst>
+                                    <p:set>
+                                      <p:cBhvr>
+                                        <p:cTn id="34" dur="1" fill="hold">
+                                          <p:stCondLst>
+                                            <p:cond delay="0"/>
+                                          </p:stCondLst>
+                                        </p:cTn>
+                                        <p:tgtEl>
+                                          <p:spTgt spid="5">
+                                            <p:txEl>
+                                              <p:pRg st="7" end="7"/>
+                                            </p:txEl>
+                                          </p:spTgt>
+                                        </p:tgtEl>
+                                        <p:attrNameLst>
+                                          <p:attrName>style.visibility</p:attrName>
+                                        </p:attrNameLst>
+                                      </p:cBhvr>
+                                      <p:to>
+                                        <p:strVal val="visible"/>
+                                      </p:to>
+                                    </p:set>
+                                  </p:childTnLst>
+                                </p:cTn>
+                              </p:par>
+                            </p:childTnLst>
+                          </p:cTn>
+                        </p:par>
+                      </p:childTnLst>
+                    </p:cTn>
+                  </p:par>
                 </p:childTnLst>
               </p:cTn>
               <p:prevCondLst>
@@ -5027,7 +5433,7 @@
 </p:sld>
 </file>
 
-<file path=ppt/slides/slide16.xml><?xml version="1.0" encoding="utf-8"?>
+<file path=ppt/slides/slide17.xml><?xml version="1.0" encoding="utf-8"?>
 <p:sld xmlns:a="http://schemas.openxmlformats.org/drawingml/2006/main" xmlns:r="http://schemas.openxmlformats.org/officeDocument/2006/relationships" xmlns:p="http://schemas.openxmlformats.org/presentationml/2006/main">
   <p:cSld>
     <p:spTree>
@@ -5054,16 +5460,22 @@
             <p:ph type="title"/>
           </p:nvPr>
         </p:nvSpPr>
-        <p:spPr/>
+        <p:spPr>
+          <a:xfrm>
+            <a:off x="1006365" y="5081587"/>
+            <a:ext cx="10515600" cy="1325563"/>
+          </a:xfrm>
+        </p:spPr>
         <p:txBody>
           <a:bodyPr>
             <a:normAutofit/>
           </a:bodyPr>
           <a:lstStyle/>
           <a:p>
-            <a:r>
-              <a:rPr lang="sl-SI" sz="4000" dirty="0"/>
-              <a:t>Zaključek</a:t>
+            <a:pPr algn="ctr"/>
+            <a:r>
+              <a:rPr lang="sl-SI" sz="4000" dirty="0" err="1"/>
+              <a:t>CashSensei</a:t>
             </a:r>
             <a:endParaRPr lang="en-US" sz="4000" dirty="0"/>
           </a:p>
@@ -5079,40 +5491,17 @@
             <p:ph idx="1"/>
           </p:nvPr>
         </p:nvSpPr>
-        <p:spPr/>
-        <p:txBody>
-          <a:bodyPr/>
-          <a:lstStyle/>
-          <a:p>
-            <a:pPr marL="0" indent="0" algn="ctr">
-              <a:buNone/>
-            </a:pPr>
-            <a:endParaRPr lang="sl-SI" dirty="0"/>
-          </a:p>
-          <a:p>
-            <a:pPr marL="0" indent="0" algn="ctr">
-              <a:buNone/>
-            </a:pPr>
-            <a:endParaRPr lang="sl-SI" dirty="0"/>
-          </a:p>
-          <a:p>
-            <a:pPr marL="0" indent="0" algn="ctr">
-              <a:buNone/>
-            </a:pPr>
-            <a:endParaRPr lang="sl-SI" dirty="0"/>
-          </a:p>
-          <a:p>
-            <a:pPr marL="0" indent="0" algn="ctr">
-              <a:buNone/>
-            </a:pPr>
-            <a:endParaRPr lang="sl-SI" dirty="0"/>
-          </a:p>
-          <a:p>
-            <a:pPr marL="0" indent="0" algn="ctr">
-              <a:buNone/>
-            </a:pPr>
-            <a:endParaRPr lang="sl-SI" dirty="0"/>
-          </a:p>
+        <p:spPr>
+          <a:xfrm>
+            <a:off x="838200" y="3752192"/>
+            <a:ext cx="10515600" cy="1240221"/>
+          </a:xfrm>
+        </p:spPr>
+        <p:txBody>
+          <a:bodyPr>
+            <a:normAutofit/>
+          </a:bodyPr>
+          <a:lstStyle/>
           <a:p>
             <a:pPr marL="0" indent="0" algn="ctr">
               <a:buNone/>
@@ -5229,7 +5618,7 @@
         </p:blipFill>
         <p:spPr>
           <a:xfrm>
-            <a:off x="5081446" y="2055812"/>
+            <a:off x="5081446" y="998223"/>
             <a:ext cx="2029108" cy="2257740"/>
           </a:xfrm>
           <a:prstGeom prst="rect">
@@ -5328,9 +5717,54 @@
                                         <p:tgtEl>
                                           <p:spTgt spid="4">
                                             <p:txEl>
-                                              <p:pRg st="6" end="6"/>
+                                              <p:pRg st="1" end="1"/>
                                             </p:txEl>
                                           </p:spTgt>
+                                        </p:tgtEl>
+                                        <p:attrNameLst>
+                                          <p:attrName>style.visibility</p:attrName>
+                                        </p:attrNameLst>
+                                      </p:cBhvr>
+                                      <p:to>
+                                        <p:strVal val="visible"/>
+                                      </p:to>
+                                    </p:set>
+                                  </p:childTnLst>
+                                </p:cTn>
+                              </p:par>
+                            </p:childTnLst>
+                          </p:cTn>
+                        </p:par>
+                      </p:childTnLst>
+                    </p:cTn>
+                  </p:par>
+                  <p:par>
+                    <p:cTn id="11" fill="hold">
+                      <p:stCondLst>
+                        <p:cond delay="indefinite"/>
+                      </p:stCondLst>
+                      <p:childTnLst>
+                        <p:par>
+                          <p:cTn id="12" fill="hold">
+                            <p:stCondLst>
+                              <p:cond delay="0"/>
+                            </p:stCondLst>
+                            <p:childTnLst>
+                              <p:par>
+                                <p:cTn id="13" presetID="1" presetClass="entr" presetSubtype="0" fill="hold" grpId="0" nodeType="clickEffect">
+                                  <p:stCondLst>
+                                    <p:cond delay="0"/>
+                                  </p:stCondLst>
+                                  <p:childTnLst>
+                                    <p:set>
+                                      <p:cBhvr>
+                                        <p:cTn id="14" dur="1" fill="hold">
+                                          <p:stCondLst>
+                                            <p:cond delay="0"/>
+                                          </p:stCondLst>
+                                        </p:cTn>
+                                        <p:tgtEl>
+                                          <p:spTgt spid="2"/>
                                         </p:tgtEl>
                                         <p:attrNameLst>
                                           <p:attrName>style.visibility</p:attrName>
@@ -5370,68 +5804,10 @@
         </p:cTn>
       </p:par>
     </p:tnLst>
+    <p:bldLst>
+      <p:bldP spid="2" grpId="0"/>
+    </p:bldLst>
   </p:timing>
-</p:sld>
-</file>
-
-<file path=ppt/slides/slide17.xml><?xml version="1.0" encoding="utf-8"?>
-<p:sld xmlns:a="http://schemas.openxmlformats.org/drawingml/2006/main" xmlns:r="http://schemas.openxmlformats.org/officeDocument/2006/relationships" xmlns:p="http://schemas.openxmlformats.org/presentationml/2006/main">
-  <p:cSld>
-    <p:spTree>
-      <p:nvGrpSpPr>
-        <p:cNvPr id="1" name=""/>
-        <p:cNvGrpSpPr/>
-        <p:nvPr/>
-      </p:nvGrpSpPr>
-      <p:grpSpPr>
-        <a:xfrm>
-          <a:off x="0" y="0"/>
-          <a:ext cx="0" cy="0"/>
-          <a:chOff x="0" y="0"/>
-          <a:chExt cx="0" cy="0"/>
-        </a:xfrm>
-      </p:grpSpPr>
-      <p:sp>
-        <p:nvSpPr>
-          <p:cNvPr id="2" name="Naslov 1"/>
-          <p:cNvSpPr>
-            <a:spLocks noGrp="1"/>
-          </p:cNvSpPr>
-          <p:nvPr>
-            <p:ph type="title"/>
-          </p:nvPr>
-        </p:nvSpPr>
-        <p:spPr>
-          <a:xfrm>
-            <a:off x="838200" y="2766219"/>
-            <a:ext cx="10515600" cy="1325563"/>
-          </a:xfrm>
-        </p:spPr>
-        <p:txBody>
-          <a:bodyPr>
-            <a:normAutofit/>
-          </a:bodyPr>
-          <a:lstStyle/>
-          <a:p>
-            <a:pPr algn="ctr"/>
-            <a:r>
-              <a:rPr lang="sl-SI" sz="4000" dirty="0"/>
-              <a:t>Hvala!</a:t>
-            </a:r>
-            <a:endParaRPr lang="en-US" sz="4000" dirty="0"/>
-          </a:p>
-        </p:txBody>
-      </p:sp>
-    </p:spTree>
-    <p:extLst>
-      <p:ext uri="{BB962C8B-B14F-4D97-AF65-F5344CB8AC3E}">
-        <p14:creationId xmlns:p14="http://schemas.microsoft.com/office/powerpoint/2010/main" val="2943673991"/>
-      </p:ext>
-    </p:extLst>
-  </p:cSld>
-  <p:clrMapOvr>
-    <a:masterClrMapping/>
-  </p:clrMapOvr>
 </p:sld>
 </file>
 
@@ -5454,13 +5830,7 @@
       </p:grpSpPr>
       <p:sp>
         <p:nvSpPr>
-          <p:cNvPr id="2" name="Naslov 1">
-            <a:extLst>
-              <a:ext uri="{FF2B5EF4-FFF2-40B4-BE49-F238E27FC236}">
-                <a16:creationId xmlns:a16="http://schemas.microsoft.com/office/drawing/2014/main" id="{B46B1CEC-885D-D05A-40DE-405F636DFD4C}"/>
-              </a:ext>
-            </a:extLst>
-          </p:cNvPr>
+          <p:cNvPr id="2" name="Naslov 1"/>
           <p:cNvSpPr>
             <a:spLocks noGrp="1"/>
           </p:cNvSpPr>
@@ -5468,44 +5838,31 @@
             <p:ph type="title"/>
           </p:nvPr>
         </p:nvSpPr>
-        <p:spPr/>
-        <p:txBody>
-          <a:bodyPr/>
-          <a:lstStyle/>
-          <a:p>
-            <a:endParaRPr lang="sl-SI"/>
-          </a:p>
-        </p:txBody>
-      </p:sp>
-      <p:sp>
-        <p:nvSpPr>
-          <p:cNvPr id="3" name="Označba mesta vsebine 2">
-            <a:extLst>
-              <a:ext uri="{FF2B5EF4-FFF2-40B4-BE49-F238E27FC236}">
-                <a16:creationId xmlns:a16="http://schemas.microsoft.com/office/drawing/2014/main" id="{94106FA7-C445-FE9A-60FF-6A8BD0E5F526}"/>
-              </a:ext>
-            </a:extLst>
-          </p:cNvPr>
-          <p:cNvSpPr>
-            <a:spLocks noGrp="1"/>
-          </p:cNvSpPr>
-          <p:nvPr>
-            <p:ph idx="1"/>
-          </p:nvPr>
-        </p:nvSpPr>
-        <p:spPr/>
-        <p:txBody>
-          <a:bodyPr/>
-          <a:lstStyle/>
-          <a:p>
-            <a:endParaRPr lang="sl-SI"/>
+        <p:spPr>
+          <a:xfrm>
+            <a:off x="838200" y="2766219"/>
+            <a:ext cx="10515600" cy="1325563"/>
+          </a:xfrm>
+        </p:spPr>
+        <p:txBody>
+          <a:bodyPr>
+            <a:normAutofit/>
+          </a:bodyPr>
+          <a:lstStyle/>
+          <a:p>
+            <a:pPr algn="ctr"/>
+            <a:r>
+              <a:rPr lang="sl-SI" sz="4000" dirty="0"/>
+              <a:t>Hvala!</a:t>
+            </a:r>
+            <a:endParaRPr lang="en-US" sz="4000" dirty="0"/>
           </a:p>
         </p:txBody>
       </p:sp>
     </p:spTree>
     <p:extLst>
       <p:ext uri="{BB962C8B-B14F-4D97-AF65-F5344CB8AC3E}">
-        <p14:creationId xmlns:p14="http://schemas.microsoft.com/office/powerpoint/2010/main" val="3966177968"/>
+        <p14:creationId xmlns:p14="http://schemas.microsoft.com/office/powerpoint/2010/main" val="2943673991"/>
       </p:ext>
     </p:extLst>
   </p:cSld>
@@ -5534,69 +5891,58 @@
       </p:grpSpPr>
       <p:sp>
         <p:nvSpPr>
-          <p:cNvPr id="2" name="Naslov 1"/>
-          <p:cNvSpPr>
-            <a:spLocks noGrp="1"/>
-          </p:cNvSpPr>
-          <p:nvPr>
-            <p:ph type="title"/>
-          </p:nvPr>
-        </p:nvSpPr>
-        <p:spPr>
-          <a:xfrm>
-            <a:off x="838200" y="2766219"/>
-            <a:ext cx="10515600" cy="1325563"/>
-          </a:xfrm>
-        </p:spPr>
-        <p:txBody>
-          <a:bodyPr>
-            <a:normAutofit/>
-          </a:bodyPr>
-          <a:lstStyle/>
-          <a:p>
-            <a:pPr algn="ctr"/>
-            <a:r>
-              <a:rPr lang="sl-SI" sz="4000" dirty="0"/>
-              <a:t>Vprašanja</a:t>
-            </a:r>
-            <a:endParaRPr lang="en-US" sz="4000" dirty="0"/>
-          </a:p>
-        </p:txBody>
-      </p:sp>
-      <p:pic>
-        <p:nvPicPr>
-          <p:cNvPr id="4" name="Slika 3">
+          <p:cNvPr id="2" name="Naslov 1">
             <a:extLst>
               <a:ext uri="{FF2B5EF4-FFF2-40B4-BE49-F238E27FC236}">
-                <a16:creationId xmlns:a16="http://schemas.microsoft.com/office/drawing/2014/main" id="{B24E8C3D-2E13-2EF6-A831-B74CAA20CED0}"/>
+                <a16:creationId xmlns:a16="http://schemas.microsoft.com/office/drawing/2014/main" id="{B46B1CEC-885D-D05A-40DE-405F636DFD4C}"/>
               </a:ext>
             </a:extLst>
           </p:cNvPr>
-          <p:cNvPicPr>
-            <a:picLocks noChangeAspect="1"/>
-          </p:cNvPicPr>
-          <p:nvPr/>
-        </p:nvPicPr>
-        <p:blipFill>
-          <a:blip r:embed="rId3"/>
-          <a:stretch>
-            <a:fillRect/>
-          </a:stretch>
-        </p:blipFill>
-        <p:spPr>
-          <a:xfrm>
-            <a:off x="2554799" y="1029904"/>
-            <a:ext cx="7082401" cy="4798191"/>
-          </a:xfrm>
-          <a:prstGeom prst="rect">
-            <a:avLst/>
-          </a:prstGeom>
-        </p:spPr>
-      </p:pic>
+          <p:cNvSpPr>
+            <a:spLocks noGrp="1"/>
+          </p:cNvSpPr>
+          <p:nvPr>
+            <p:ph type="title"/>
+          </p:nvPr>
+        </p:nvSpPr>
+        <p:spPr/>
+        <p:txBody>
+          <a:bodyPr/>
+          <a:lstStyle/>
+          <a:p>
+            <a:endParaRPr lang="sl-SI"/>
+          </a:p>
+        </p:txBody>
+      </p:sp>
+      <p:sp>
+        <p:nvSpPr>
+          <p:cNvPr id="3" name="Označba mesta vsebine 2">
+            <a:extLst>
+              <a:ext uri="{FF2B5EF4-FFF2-40B4-BE49-F238E27FC236}">
+                <a16:creationId xmlns:a16="http://schemas.microsoft.com/office/drawing/2014/main" id="{94106FA7-C445-FE9A-60FF-6A8BD0E5F526}"/>
+              </a:ext>
+            </a:extLst>
+          </p:cNvPr>
+          <p:cNvSpPr>
+            <a:spLocks noGrp="1"/>
+          </p:cNvSpPr>
+          <p:nvPr>
+            <p:ph idx="1"/>
+          </p:nvPr>
+        </p:nvSpPr>
+        <p:spPr/>
+        <p:txBody>
+          <a:bodyPr/>
+          <a:lstStyle/>
+          <a:p>
+            <a:endParaRPr lang="sl-SI"/>
+          </a:p>
+        </p:txBody>
+      </p:sp>
     </p:spTree>
     <p:extLst>
       <p:ext uri="{BB962C8B-B14F-4D97-AF65-F5344CB8AC3E}">
-        <p14:creationId xmlns:p14="http://schemas.microsoft.com/office/powerpoint/2010/main" val="1785231649"/>
+        <p14:creationId xmlns:p14="http://schemas.microsoft.com/office/powerpoint/2010/main" val="3966177968"/>
       </p:ext>
     </p:extLst>
   </p:cSld>
@@ -5837,6 +6183,97 @@
       </p:par>
     </p:tnLst>
   </p:timing>
+</p:sld>
+</file>
+
+<file path=ppt/slides/slide20.xml><?xml version="1.0" encoding="utf-8"?>
+<p:sld xmlns:a="http://schemas.openxmlformats.org/drawingml/2006/main" xmlns:r="http://schemas.openxmlformats.org/officeDocument/2006/relationships" xmlns:p="http://schemas.openxmlformats.org/presentationml/2006/main">
+  <p:cSld>
+    <p:spTree>
+      <p:nvGrpSpPr>
+        <p:cNvPr id="1" name=""/>
+        <p:cNvGrpSpPr/>
+        <p:nvPr/>
+      </p:nvGrpSpPr>
+      <p:grpSpPr>
+        <a:xfrm>
+          <a:off x="0" y="0"/>
+          <a:ext cx="0" cy="0"/>
+          <a:chOff x="0" y="0"/>
+          <a:chExt cx="0" cy="0"/>
+        </a:xfrm>
+      </p:grpSpPr>
+      <p:sp>
+        <p:nvSpPr>
+          <p:cNvPr id="2" name="Naslov 1"/>
+          <p:cNvSpPr>
+            <a:spLocks noGrp="1"/>
+          </p:cNvSpPr>
+          <p:nvPr>
+            <p:ph type="title"/>
+          </p:nvPr>
+        </p:nvSpPr>
+        <p:spPr>
+          <a:xfrm>
+            <a:off x="838200" y="2766219"/>
+            <a:ext cx="10515600" cy="1325563"/>
+          </a:xfrm>
+        </p:spPr>
+        <p:txBody>
+          <a:bodyPr>
+            <a:normAutofit/>
+          </a:bodyPr>
+          <a:lstStyle/>
+          <a:p>
+            <a:pPr algn="ctr"/>
+            <a:r>
+              <a:rPr lang="sl-SI" sz="4000" dirty="0"/>
+              <a:t>Vprašanja</a:t>
+            </a:r>
+            <a:endParaRPr lang="en-US" sz="4000" dirty="0"/>
+          </a:p>
+        </p:txBody>
+      </p:sp>
+      <p:pic>
+        <p:nvPicPr>
+          <p:cNvPr id="4" name="Slika 3">
+            <a:extLst>
+              <a:ext uri="{FF2B5EF4-FFF2-40B4-BE49-F238E27FC236}">
+                <a16:creationId xmlns:a16="http://schemas.microsoft.com/office/drawing/2014/main" id="{B24E8C3D-2E13-2EF6-A831-B74CAA20CED0}"/>
+              </a:ext>
+            </a:extLst>
+          </p:cNvPr>
+          <p:cNvPicPr>
+            <a:picLocks noChangeAspect="1"/>
+          </p:cNvPicPr>
+          <p:nvPr/>
+        </p:nvPicPr>
+        <p:blipFill>
+          <a:blip r:embed="rId3"/>
+          <a:stretch>
+            <a:fillRect/>
+          </a:stretch>
+        </p:blipFill>
+        <p:spPr>
+          <a:xfrm>
+            <a:off x="2554799" y="1029904"/>
+            <a:ext cx="7082401" cy="4798191"/>
+          </a:xfrm>
+          <a:prstGeom prst="rect">
+            <a:avLst/>
+          </a:prstGeom>
+        </p:spPr>
+      </p:pic>
+    </p:spTree>
+    <p:extLst>
+      <p:ext uri="{BB962C8B-B14F-4D97-AF65-F5344CB8AC3E}">
+        <p14:creationId xmlns:p14="http://schemas.microsoft.com/office/powerpoint/2010/main" val="1785231649"/>
+      </p:ext>
+    </p:extLst>
+  </p:cSld>
+  <p:clrMapOvr>
+    <a:masterClrMapping/>
+  </p:clrMapOvr>
 </p:sld>
 </file>
 
@@ -7061,7 +7498,7 @@
           <p:nvPr/>
         </p:nvPicPr>
         <p:blipFill>
-          <a:blip r:embed="rId2"/>
+          <a:blip r:embed="rId3"/>
           <a:stretch>
             <a:fillRect/>
           </a:stretch>
@@ -7108,6 +7545,99 @@
       </p:grpSpPr>
       <p:sp>
         <p:nvSpPr>
+          <p:cNvPr id="2" name="Naslov 1">
+            <a:extLst>
+              <a:ext uri="{FF2B5EF4-FFF2-40B4-BE49-F238E27FC236}">
+                <a16:creationId xmlns:a16="http://schemas.microsoft.com/office/drawing/2014/main" id="{EFC70A13-7791-DF9A-4D22-73FC0CE9037A}"/>
+              </a:ext>
+            </a:extLst>
+          </p:cNvPr>
+          <p:cNvSpPr>
+            <a:spLocks noGrp="1"/>
+          </p:cNvSpPr>
+          <p:nvPr>
+            <p:ph type="title"/>
+          </p:nvPr>
+        </p:nvSpPr>
+        <p:spPr/>
+        <p:txBody>
+          <a:bodyPr/>
+          <a:lstStyle/>
+          <a:p>
+            <a:r>
+              <a:rPr lang="sl-SI" dirty="0"/>
+              <a:t>HTA</a:t>
+            </a:r>
+          </a:p>
+        </p:txBody>
+      </p:sp>
+      <p:pic>
+        <p:nvPicPr>
+          <p:cNvPr id="5" name="Označba mesta vsebine 4" descr="Slika, ki vsebuje besede besedilo, posnetek zaslona, pisava, vrstica&#10;&#10;Opis je samodejno ustvarjen">
+            <a:extLst>
+              <a:ext uri="{FF2B5EF4-FFF2-40B4-BE49-F238E27FC236}">
+                <a16:creationId xmlns:a16="http://schemas.microsoft.com/office/drawing/2014/main" id="{EC351DB2-C7C6-764F-241E-760460A3E26C}"/>
+              </a:ext>
+            </a:extLst>
+          </p:cNvPr>
+          <p:cNvPicPr>
+            <a:picLocks noGrp="1" noChangeAspect="1"/>
+          </p:cNvPicPr>
+          <p:nvPr>
+            <p:ph idx="1"/>
+          </p:nvPr>
+        </p:nvPicPr>
+        <p:blipFill>
+          <a:blip r:embed="rId2">
+            <a:extLst>
+              <a:ext uri="{28A0092B-C50C-407E-A947-70E740481C1C}">
+                <a14:useLocalDpi xmlns:a14="http://schemas.microsoft.com/office/drawing/2010/main" val="0"/>
+              </a:ext>
+            </a:extLst>
+          </a:blip>
+          <a:stretch>
+            <a:fillRect/>
+          </a:stretch>
+        </p:blipFill>
+        <p:spPr>
+          <a:xfrm>
+            <a:off x="2792693" y="227449"/>
+            <a:ext cx="6606614" cy="6403101"/>
+          </a:xfrm>
+        </p:spPr>
+      </p:pic>
+    </p:spTree>
+    <p:extLst>
+      <p:ext uri="{BB962C8B-B14F-4D97-AF65-F5344CB8AC3E}">
+        <p14:creationId xmlns:p14="http://schemas.microsoft.com/office/powerpoint/2010/main" val="383258308"/>
+      </p:ext>
+    </p:extLst>
+  </p:cSld>
+  <p:clrMapOvr>
+    <a:masterClrMapping/>
+  </p:clrMapOvr>
+</p:sld>
+</file>
+
+<file path=ppt/slides/slide8.xml><?xml version="1.0" encoding="utf-8"?>
+<p:sld xmlns:a="http://schemas.openxmlformats.org/drawingml/2006/main" xmlns:r="http://schemas.openxmlformats.org/officeDocument/2006/relationships" xmlns:p="http://schemas.openxmlformats.org/presentationml/2006/main">
+  <p:cSld>
+    <p:spTree>
+      <p:nvGrpSpPr>
+        <p:cNvPr id="1" name=""/>
+        <p:cNvGrpSpPr/>
+        <p:nvPr/>
+      </p:nvGrpSpPr>
+      <p:grpSpPr>
+        <a:xfrm>
+          <a:off x="0" y="0"/>
+          <a:ext cx="0" cy="0"/>
+          <a:chOff x="0" y="0"/>
+          <a:chExt cx="0" cy="0"/>
+        </a:xfrm>
+      </p:grpSpPr>
+      <p:sp>
+        <p:nvSpPr>
           <p:cNvPr id="2" name="Naslov 1"/>
           <p:cNvSpPr>
             <a:spLocks noGrp="1"/>
@@ -7198,7 +7728,7 @@
 </p:sld>
 </file>
 
-<file path=ppt/slides/slide8.xml><?xml version="1.0" encoding="utf-8"?>
+<file path=ppt/slides/slide9.xml><?xml version="1.0" encoding="utf-8"?>
 <p:sld xmlns:a="http://schemas.openxmlformats.org/drawingml/2006/main" xmlns:r="http://schemas.openxmlformats.org/officeDocument/2006/relationships" xmlns:p="http://schemas.openxmlformats.org/presentationml/2006/main">
   <p:cSld>
     <p:spTree>
@@ -7295,112 +7825,6 @@
     <p:extLst>
       <p:ext uri="{BB962C8B-B14F-4D97-AF65-F5344CB8AC3E}">
         <p14:creationId xmlns:p14="http://schemas.microsoft.com/office/powerpoint/2010/main" val="3793115895"/>
-      </p:ext>
-    </p:extLst>
-  </p:cSld>
-  <p:clrMapOvr>
-    <a:masterClrMapping/>
-  </p:clrMapOvr>
-</p:sld>
-</file>
-
-<file path=ppt/slides/slide9.xml><?xml version="1.0" encoding="utf-8"?>
-<p:sld xmlns:a="http://schemas.openxmlformats.org/drawingml/2006/main" xmlns:r="http://schemas.openxmlformats.org/officeDocument/2006/relationships" xmlns:p="http://schemas.openxmlformats.org/presentationml/2006/main">
-  <p:cSld>
-    <p:spTree>
-      <p:nvGrpSpPr>
-        <p:cNvPr id="1" name=""/>
-        <p:cNvGrpSpPr/>
-        <p:nvPr/>
-      </p:nvGrpSpPr>
-      <p:grpSpPr>
-        <a:xfrm>
-          <a:off x="0" y="0"/>
-          <a:ext cx="0" cy="0"/>
-          <a:chOff x="0" y="0"/>
-          <a:chExt cx="0" cy="0"/>
-        </a:xfrm>
-      </p:grpSpPr>
-      <p:sp>
-        <p:nvSpPr>
-          <p:cNvPr id="2" name="Naslov 1"/>
-          <p:cNvSpPr>
-            <a:spLocks noGrp="1"/>
-          </p:cNvSpPr>
-          <p:nvPr>
-            <p:ph type="title"/>
-          </p:nvPr>
-        </p:nvSpPr>
-        <p:spPr/>
-        <p:txBody>
-          <a:bodyPr>
-            <a:normAutofit/>
-          </a:bodyPr>
-          <a:lstStyle/>
-          <a:p>
-            <a:endParaRPr lang="sl-SI" sz="4000" dirty="0"/>
-          </a:p>
-        </p:txBody>
-      </p:sp>
-      <p:sp>
-        <p:nvSpPr>
-          <p:cNvPr id="5" name="Označba mesta vsebine 4">
-            <a:extLst>
-              <a:ext uri="{FF2B5EF4-FFF2-40B4-BE49-F238E27FC236}">
-                <a16:creationId xmlns:a16="http://schemas.microsoft.com/office/drawing/2014/main" id="{019D1206-CF02-903C-3F0A-85F777FD8A28}"/>
-              </a:ext>
-            </a:extLst>
-          </p:cNvPr>
-          <p:cNvSpPr>
-            <a:spLocks noGrp="1"/>
-          </p:cNvSpPr>
-          <p:nvPr>
-            <p:ph idx="1"/>
-          </p:nvPr>
-        </p:nvSpPr>
-        <p:spPr/>
-        <p:txBody>
-          <a:bodyPr/>
-          <a:lstStyle/>
-          <a:p>
-            <a:endParaRPr lang="sl-SI" dirty="0"/>
-          </a:p>
-        </p:txBody>
-      </p:sp>
-      <p:pic>
-        <p:nvPicPr>
-          <p:cNvPr id="6" name="Slika 5">
-            <a:extLst>
-              <a:ext uri="{FF2B5EF4-FFF2-40B4-BE49-F238E27FC236}">
-                <a16:creationId xmlns:a16="http://schemas.microsoft.com/office/drawing/2014/main" id="{B861D025-6ED4-30C8-C742-51A4B16184EC}"/>
-              </a:ext>
-            </a:extLst>
-          </p:cNvPr>
-          <p:cNvPicPr>
-            <a:picLocks noChangeAspect="1"/>
-          </p:cNvPicPr>
-          <p:nvPr/>
-        </p:nvPicPr>
-        <p:blipFill>
-          <a:blip r:embed="rId2"/>
-          <a:stretch>
-            <a:fillRect/>
-          </a:stretch>
-        </p:blipFill>
-        <p:spPr>
-          <a:xfrm>
-            <a:off x="4237932" y="0"/>
-            <a:ext cx="3716136" cy="7966785"/>
-          </a:xfrm>
-          <a:prstGeom prst="rect">
-            <a:avLst/>
-          </a:prstGeom>
-        </p:spPr>
-      </p:pic>
-    </p:spTree>
-    <p:extLst>
-      <p:ext uri="{BB962C8B-B14F-4D97-AF65-F5344CB8AC3E}">
-        <p14:creationId xmlns:p14="http://schemas.microsoft.com/office/powerpoint/2010/main" val="140690240"/>
       </p:ext>
     </p:extLst>
   </p:cSld>

</xml_diff>